<commit_message>
Initial commit wihtout .env file
</commit_message>
<xml_diff>
--- a/test_file.pptx
+++ b/test_file.pptx
@@ -6,6 +6,9 @@
   </p:sldMasterIdLst>
   <p:sldIdLst>
     <p:sldId id="256" r:id="rId9"/>
+    <p:sldId id="257" r:id="rId10"/>
+    <p:sldId id="258" r:id="rId11"/>
+    <p:sldId id="259" r:id="rId12"/>
   </p:sldIdLst>
   <p:sldSz cx="12192000" cy="6858000"/>
   <p:notesSz cx="6797675" cy="9926638"/>
@@ -1566,6 +1569,672 @@
           <a:p>
             <a:r>
               <a:t>Give this a title</a:t>
+            </a:r>
+          </a:p>
+        </p:txBody>
+      </p:sp>
+    </p:spTree>
+  </p:cSld>
+  <p:clrMapOvr>
+    <a:masterClrMapping/>
+  </p:clrMapOvr>
+</p:sld>
+</file>
+
+<file path=ppt/slides/slide2.xml><?xml version="1.0" encoding="utf-8"?>
+<p:sld xmlns:a="http://schemas.openxmlformats.org/drawingml/2006/main" xmlns:p="http://schemas.openxmlformats.org/presentationml/2006/main" xmlns:r="http://schemas.openxmlformats.org/officeDocument/2006/relationships">
+  <p:cSld>
+    <p:spTree>
+      <p:nvGrpSpPr>
+        <p:cNvPr id="1" name=""/>
+        <p:cNvGrpSpPr/>
+        <p:nvPr/>
+      </p:nvGrpSpPr>
+      <p:grpSpPr/>
+      <p:sp>
+        <p:nvSpPr>
+          <p:cNvPr id="2" name="Title 1"/>
+          <p:cNvSpPr>
+            <a:spLocks noGrp="1"/>
+          </p:cNvSpPr>
+          <p:nvPr>
+            <p:ph type="title"/>
+          </p:nvPr>
+        </p:nvSpPr>
+        <p:spPr/>
+        <p:txBody>
+          <a:bodyPr/>
+          <a:lstStyle/>
+          <a:p>
+            <a:r>
+              <a:t>We were able to give it a title</a:t>
+            </a:r>
+          </a:p>
+        </p:txBody>
+      </p:sp>
+    </p:spTree>
+  </p:cSld>
+  <p:clrMapOvr>
+    <a:masterClrMapping/>
+  </p:clrMapOvr>
+</p:sld>
+</file>
+
+<file path=ppt/slides/slide3.xml><?xml version="1.0" encoding="utf-8"?>
+<p:sld xmlns:a="http://schemas.openxmlformats.org/drawingml/2006/main" xmlns:p="http://schemas.openxmlformats.org/presentationml/2006/main" xmlns:r="http://schemas.openxmlformats.org/officeDocument/2006/relationships">
+  <p:cSld>
+    <p:spTree>
+      <p:nvGrpSpPr>
+        <p:cNvPr id="1" name=""/>
+        <p:cNvGrpSpPr/>
+        <p:nvPr/>
+      </p:nvGrpSpPr>
+      <p:grpSpPr/>
+      <p:sp>
+        <p:nvSpPr>
+          <p:cNvPr id="2" name="Title 1"/>
+          <p:cNvSpPr>
+            <a:spLocks noGrp="1"/>
+          </p:cNvSpPr>
+          <p:nvPr>
+            <p:ph type="title"/>
+          </p:nvPr>
+        </p:nvSpPr>
+        <p:spPr/>
+        <p:txBody>
+          <a:bodyPr/>
+          <a:lstStyle/>
+          <a:p>
+            <a:r>
+              <a:t>Sized Column Layout</a:t>
+            </a:r>
+          </a:p>
+        </p:txBody>
+      </p:sp>
+      <p:sp>
+        <p:nvSpPr>
+          <p:cNvPr id="3" name="Rectangle 2"/>
+          <p:cNvSpPr/>
+          <p:nvPr/>
+        </p:nvSpPr>
+        <p:spPr>
+          <a:xfrm>
+            <a:off x="457200" y="1371600"/>
+            <a:ext cx="4436668" cy="4572000"/>
+          </a:xfrm>
+          <a:prstGeom prst="rect">
+            <a:avLst/>
+          </a:prstGeom>
+          <a:solidFill>
+            <a:srgbClr val="F0F0F0"/>
+          </a:solidFill>
+          <a:ln>
+            <a:solidFill>
+              <a:srgbClr val="C8C8C8"/>
+            </a:solidFill>
+          </a:ln>
+        </p:spPr>
+        <p:style>
+          <a:lnRef idx="1">
+            <a:schemeClr val="accent1"/>
+          </a:lnRef>
+          <a:fillRef idx="3">
+            <a:schemeClr val="accent1"/>
+          </a:fillRef>
+          <a:effectRef idx="2">
+            <a:schemeClr val="accent1"/>
+          </a:effectRef>
+          <a:fontRef idx="minor">
+            <a:schemeClr val="lt1"/>
+          </a:fontRef>
+        </p:style>
+        <p:txBody>
+          <a:bodyPr rtlCol="0" anchor="ctr"/>
+          <a:lstStyle/>
+          <a:p>
+            <a:pPr algn="ctr"/>
+          </a:p>
+        </p:txBody>
+      </p:sp>
+      <p:sp>
+        <p:nvSpPr>
+          <p:cNvPr id="4" name="TextBox 3"/>
+          <p:cNvSpPr txBox="1"/>
+          <p:nvPr/>
+        </p:nvSpPr>
+        <p:spPr>
+          <a:xfrm>
+            <a:off x="548640" y="1463040"/>
+            <a:ext cx="4253788" cy="457200"/>
+          </a:xfrm>
+          <a:prstGeom prst="rect">
+            <a:avLst/>
+          </a:prstGeom>
+          <a:noFill/>
+        </p:spPr>
+        <p:txBody>
+          <a:bodyPr wrap="none">
+            <a:spAutoFit/>
+          </a:bodyPr>
+          <a:lstStyle/>
+          <a:p>
+            <a:pPr>
+              <a:defRPr b="1"/>
+            </a:pPr>
+            <a:r>
+              <a:t>Wide Column</a:t>
+            </a:r>
+          </a:p>
+        </p:txBody>
+      </p:sp>
+      <p:sp>
+        <p:nvSpPr>
+          <p:cNvPr id="5" name="TextBox 4"/>
+          <p:cNvSpPr txBox="1"/>
+          <p:nvPr/>
+        </p:nvSpPr>
+        <p:spPr>
+          <a:xfrm>
+            <a:off x="548640" y="2011680"/>
+            <a:ext cx="4253788" cy="3840480"/>
+          </a:xfrm>
+          <a:prstGeom prst="rect">
+            <a:avLst/>
+          </a:prstGeom>
+          <a:noFill/>
+        </p:spPr>
+        <p:txBody>
+          <a:bodyPr wrap="none">
+            <a:spAutoFit/>
+          </a:bodyPr>
+          <a:lstStyle/>
+          <a:p>
+            <a:pPr/>
+            <a:r>
+              <a:t>• Content 1</a:t>
+            </a:r>
+          </a:p>
+        </p:txBody>
+      </p:sp>
+      <p:sp>
+        <p:nvSpPr>
+          <p:cNvPr id="6" name="Rectangle 5"/>
+          <p:cNvSpPr/>
+          <p:nvPr/>
+        </p:nvSpPr>
+        <p:spPr>
+          <a:xfrm>
+            <a:off x="5076748" y="1371600"/>
+            <a:ext cx="6655003" cy="4572000"/>
+          </a:xfrm>
+          <a:prstGeom prst="rect">
+            <a:avLst/>
+          </a:prstGeom>
+          <a:solidFill>
+            <a:srgbClr val="F0F0F0"/>
+          </a:solidFill>
+          <a:ln>
+            <a:solidFill>
+              <a:srgbClr val="C8C8C8"/>
+            </a:solidFill>
+          </a:ln>
+        </p:spPr>
+        <p:style>
+          <a:lnRef idx="1">
+            <a:schemeClr val="accent1"/>
+          </a:lnRef>
+          <a:fillRef idx="3">
+            <a:schemeClr val="accent1"/>
+          </a:fillRef>
+          <a:effectRef idx="2">
+            <a:schemeClr val="accent1"/>
+          </a:effectRef>
+          <a:fontRef idx="minor">
+            <a:schemeClr val="lt1"/>
+          </a:fontRef>
+        </p:style>
+        <p:txBody>
+          <a:bodyPr rtlCol="0" anchor="ctr"/>
+          <a:lstStyle/>
+          <a:p>
+            <a:pPr algn="ctr"/>
+          </a:p>
+        </p:txBody>
+      </p:sp>
+      <p:sp>
+        <p:nvSpPr>
+          <p:cNvPr id="7" name="TextBox 6"/>
+          <p:cNvSpPr txBox="1"/>
+          <p:nvPr/>
+        </p:nvSpPr>
+        <p:spPr>
+          <a:xfrm>
+            <a:off x="5168188" y="1463040"/>
+            <a:ext cx="6472123" cy="457200"/>
+          </a:xfrm>
+          <a:prstGeom prst="rect">
+            <a:avLst/>
+          </a:prstGeom>
+          <a:noFill/>
+        </p:spPr>
+        <p:txBody>
+          <a:bodyPr wrap="none">
+            <a:spAutoFit/>
+          </a:bodyPr>
+          <a:lstStyle/>
+          <a:p>
+            <a:pPr>
+              <a:defRPr b="1"/>
+            </a:pPr>
+            <a:r>
+              <a:t>Narrow Column</a:t>
+            </a:r>
+          </a:p>
+        </p:txBody>
+      </p:sp>
+      <p:sp>
+        <p:nvSpPr>
+          <p:cNvPr id="8" name="TextBox 7"/>
+          <p:cNvSpPr txBox="1"/>
+          <p:nvPr/>
+        </p:nvSpPr>
+        <p:spPr>
+          <a:xfrm>
+            <a:off x="5168188" y="2011680"/>
+            <a:ext cx="6472123" cy="3840480"/>
+          </a:xfrm>
+          <a:prstGeom prst="rect">
+            <a:avLst/>
+          </a:prstGeom>
+          <a:noFill/>
+        </p:spPr>
+        <p:txBody>
+          <a:bodyPr wrap="none">
+            <a:spAutoFit/>
+          </a:bodyPr>
+          <a:lstStyle/>
+          <a:p>
+            <a:pPr/>
+            <a:r>
+              <a:t>• Content 2</a:t>
+            </a:r>
+          </a:p>
+        </p:txBody>
+      </p:sp>
+    </p:spTree>
+  </p:cSld>
+  <p:clrMapOvr>
+    <a:masterClrMapping/>
+  </p:clrMapOvr>
+</p:sld>
+</file>
+
+<file path=ppt/slides/slide4.xml><?xml version="1.0" encoding="utf-8"?>
+<p:sld xmlns:a="http://schemas.openxmlformats.org/drawingml/2006/main" xmlns:p="http://schemas.openxmlformats.org/presentationml/2006/main" xmlns:r="http://schemas.openxmlformats.org/officeDocument/2006/relationships">
+  <p:cSld>
+    <p:spTree>
+      <p:nvGrpSpPr>
+        <p:cNvPr id="1" name=""/>
+        <p:cNvGrpSpPr/>
+        <p:nvPr/>
+      </p:nvGrpSpPr>
+      <p:grpSpPr/>
+      <p:sp>
+        <p:nvSpPr>
+          <p:cNvPr id="2" name="Title 1"/>
+          <p:cNvSpPr>
+            <a:spLocks noGrp="1"/>
+          </p:cNvSpPr>
+          <p:nvPr>
+            <p:ph type="title"/>
+          </p:nvPr>
+        </p:nvSpPr>
+        <p:spPr/>
+        <p:txBody>
+          <a:bodyPr/>
+          <a:lstStyle/>
+          <a:p>
+            <a:r>
+              <a:t>Sized Row Layout</a:t>
+            </a:r>
+          </a:p>
+        </p:txBody>
+      </p:sp>
+      <p:sp>
+        <p:nvSpPr>
+          <p:cNvPr id="3" name="Rectangle 2"/>
+          <p:cNvSpPr/>
+          <p:nvPr/>
+        </p:nvSpPr>
+        <p:spPr>
+          <a:xfrm>
+            <a:off x="457200" y="1371600"/>
+            <a:ext cx="11274552" cy="1388059"/>
+          </a:xfrm>
+          <a:prstGeom prst="rect">
+            <a:avLst/>
+          </a:prstGeom>
+          <a:solidFill>
+            <a:srgbClr val="F0F0F0"/>
+          </a:solidFill>
+          <a:ln>
+            <a:solidFill>
+              <a:srgbClr val="C8C8C8"/>
+            </a:solidFill>
+          </a:ln>
+        </p:spPr>
+        <p:style>
+          <a:lnRef idx="1">
+            <a:schemeClr val="accent1"/>
+          </a:lnRef>
+          <a:fillRef idx="3">
+            <a:schemeClr val="accent1"/>
+          </a:fillRef>
+          <a:effectRef idx="2">
+            <a:schemeClr val="accent1"/>
+          </a:effectRef>
+          <a:fontRef idx="minor">
+            <a:schemeClr val="lt1"/>
+          </a:fontRef>
+        </p:style>
+        <p:txBody>
+          <a:bodyPr rtlCol="0" anchor="ctr"/>
+          <a:lstStyle/>
+          <a:p>
+            <a:pPr algn="ctr"/>
+          </a:p>
+        </p:txBody>
+      </p:sp>
+      <p:sp>
+        <p:nvSpPr>
+          <p:cNvPr id="4" name="TextBox 3"/>
+          <p:cNvSpPr txBox="1"/>
+          <p:nvPr/>
+        </p:nvSpPr>
+        <p:spPr>
+          <a:xfrm>
+            <a:off x="548640" y="1463040"/>
+            <a:ext cx="11091672" cy="457200"/>
+          </a:xfrm>
+          <a:prstGeom prst="rect">
+            <a:avLst/>
+          </a:prstGeom>
+          <a:noFill/>
+        </p:spPr>
+        <p:txBody>
+          <a:bodyPr wrap="none">
+            <a:spAutoFit/>
+          </a:bodyPr>
+          <a:lstStyle/>
+          <a:p>
+            <a:pPr>
+              <a:defRPr b="1"/>
+            </a:pPr>
+            <a:r>
+              <a:t>Wide Column</a:t>
+            </a:r>
+          </a:p>
+        </p:txBody>
+      </p:sp>
+      <p:sp>
+        <p:nvSpPr>
+          <p:cNvPr id="5" name="TextBox 4"/>
+          <p:cNvSpPr txBox="1"/>
+          <p:nvPr/>
+        </p:nvSpPr>
+        <p:spPr>
+          <a:xfrm>
+            <a:off x="548640" y="2011680"/>
+            <a:ext cx="11091672" cy="656539"/>
+          </a:xfrm>
+          <a:prstGeom prst="rect">
+            <a:avLst/>
+          </a:prstGeom>
+          <a:noFill/>
+        </p:spPr>
+        <p:txBody>
+          <a:bodyPr wrap="none">
+            <a:spAutoFit/>
+          </a:bodyPr>
+          <a:lstStyle/>
+          <a:p>
+            <a:pPr/>
+            <a:r>
+              <a:t>• Content 1</a:t>
+            </a:r>
+          </a:p>
+        </p:txBody>
+      </p:sp>
+      <p:sp>
+        <p:nvSpPr>
+          <p:cNvPr id="6" name="Rectangle 5"/>
+          <p:cNvSpPr/>
+          <p:nvPr/>
+        </p:nvSpPr>
+        <p:spPr>
+          <a:xfrm>
+            <a:off x="457200" y="2942539"/>
+            <a:ext cx="11274552" cy="1388059"/>
+          </a:xfrm>
+          <a:prstGeom prst="rect">
+            <a:avLst/>
+          </a:prstGeom>
+          <a:solidFill>
+            <a:srgbClr val="F0F0F0"/>
+          </a:solidFill>
+          <a:ln>
+            <a:solidFill>
+              <a:srgbClr val="C8C8C8"/>
+            </a:solidFill>
+          </a:ln>
+        </p:spPr>
+        <p:style>
+          <a:lnRef idx="1">
+            <a:schemeClr val="accent1"/>
+          </a:lnRef>
+          <a:fillRef idx="3">
+            <a:schemeClr val="accent1"/>
+          </a:fillRef>
+          <a:effectRef idx="2">
+            <a:schemeClr val="accent1"/>
+          </a:effectRef>
+          <a:fontRef idx="minor">
+            <a:schemeClr val="lt1"/>
+          </a:fontRef>
+        </p:style>
+        <p:txBody>
+          <a:bodyPr rtlCol="0" anchor="ctr"/>
+          <a:lstStyle/>
+          <a:p>
+            <a:pPr algn="ctr"/>
+          </a:p>
+        </p:txBody>
+      </p:sp>
+      <p:sp>
+        <p:nvSpPr>
+          <p:cNvPr id="7" name="TextBox 6"/>
+          <p:cNvSpPr txBox="1"/>
+          <p:nvPr/>
+        </p:nvSpPr>
+        <p:spPr>
+          <a:xfrm>
+            <a:off x="548640" y="3033979"/>
+            <a:ext cx="11091672" cy="457200"/>
+          </a:xfrm>
+          <a:prstGeom prst="rect">
+            <a:avLst/>
+          </a:prstGeom>
+          <a:noFill/>
+        </p:spPr>
+        <p:txBody>
+          <a:bodyPr wrap="none">
+            <a:spAutoFit/>
+          </a:bodyPr>
+          <a:lstStyle/>
+          <a:p>
+            <a:pPr>
+              <a:defRPr b="1"/>
+            </a:pPr>
+            <a:r>
+              <a:t>Narrow Column</a:t>
+            </a:r>
+          </a:p>
+        </p:txBody>
+      </p:sp>
+      <p:sp>
+        <p:nvSpPr>
+          <p:cNvPr id="8" name="TextBox 7"/>
+          <p:cNvSpPr txBox="1"/>
+          <p:nvPr/>
+        </p:nvSpPr>
+        <p:spPr>
+          <a:xfrm>
+            <a:off x="548640" y="3582619"/>
+            <a:ext cx="11091672" cy="656539"/>
+          </a:xfrm>
+          <a:prstGeom prst="rect">
+            <a:avLst/>
+          </a:prstGeom>
+          <a:noFill/>
+        </p:spPr>
+        <p:txBody>
+          <a:bodyPr wrap="none">
+            <a:spAutoFit/>
+          </a:bodyPr>
+          <a:lstStyle/>
+          <a:p>
+            <a:pPr/>
+            <a:r>
+              <a:t>• Content 2</a:t>
+            </a:r>
+          </a:p>
+          <a:p>
+            <a:pPr/>
+            <a:r>
+              <a:t>• Content 3</a:t>
+            </a:r>
+          </a:p>
+          <a:p>
+            <a:pPr/>
+            <a:r>
+              <a:t>• Content 4</a:t>
+            </a:r>
+          </a:p>
+        </p:txBody>
+      </p:sp>
+      <p:sp>
+        <p:nvSpPr>
+          <p:cNvPr id="9" name="Rectangle 8"/>
+          <p:cNvSpPr/>
+          <p:nvPr/>
+        </p:nvSpPr>
+        <p:spPr>
+          <a:xfrm>
+            <a:off x="457200" y="4513478"/>
+            <a:ext cx="11274552" cy="1388059"/>
+          </a:xfrm>
+          <a:prstGeom prst="rect">
+            <a:avLst/>
+          </a:prstGeom>
+          <a:solidFill>
+            <a:srgbClr val="F0F0F0"/>
+          </a:solidFill>
+          <a:ln>
+            <a:solidFill>
+              <a:srgbClr val="C8C8C8"/>
+            </a:solidFill>
+          </a:ln>
+        </p:spPr>
+        <p:style>
+          <a:lnRef idx="1">
+            <a:schemeClr val="accent1"/>
+          </a:lnRef>
+          <a:fillRef idx="3">
+            <a:schemeClr val="accent1"/>
+          </a:fillRef>
+          <a:effectRef idx="2">
+            <a:schemeClr val="accent1"/>
+          </a:effectRef>
+          <a:fontRef idx="minor">
+            <a:schemeClr val="lt1"/>
+          </a:fontRef>
+        </p:style>
+        <p:txBody>
+          <a:bodyPr rtlCol="0" anchor="ctr"/>
+          <a:lstStyle/>
+          <a:p>
+            <a:pPr algn="ctr"/>
+          </a:p>
+        </p:txBody>
+      </p:sp>
+      <p:sp>
+        <p:nvSpPr>
+          <p:cNvPr id="10" name="TextBox 9"/>
+          <p:cNvSpPr txBox="1"/>
+          <p:nvPr/>
+        </p:nvSpPr>
+        <p:spPr>
+          <a:xfrm>
+            <a:off x="548640" y="4604918"/>
+            <a:ext cx="11091672" cy="457200"/>
+          </a:xfrm>
+          <a:prstGeom prst="rect">
+            <a:avLst/>
+          </a:prstGeom>
+          <a:noFill/>
+        </p:spPr>
+        <p:txBody>
+          <a:bodyPr wrap="none">
+            <a:spAutoFit/>
+          </a:bodyPr>
+          <a:lstStyle/>
+          <a:p>
+            <a:pPr>
+              <a:defRPr b="1"/>
+            </a:pPr>
+            <a:r>
+              <a:t>Narrow Column</a:t>
+            </a:r>
+          </a:p>
+        </p:txBody>
+      </p:sp>
+      <p:sp>
+        <p:nvSpPr>
+          <p:cNvPr id="11" name="TextBox 10"/>
+          <p:cNvSpPr txBox="1"/>
+          <p:nvPr/>
+        </p:nvSpPr>
+        <p:spPr>
+          <a:xfrm>
+            <a:off x="548640" y="5153558"/>
+            <a:ext cx="11091672" cy="656539"/>
+          </a:xfrm>
+          <a:prstGeom prst="rect">
+            <a:avLst/>
+          </a:prstGeom>
+          <a:noFill/>
+        </p:spPr>
+        <p:txBody>
+          <a:bodyPr wrap="none">
+            <a:spAutoFit/>
+          </a:bodyPr>
+          <a:lstStyle/>
+          <a:p>
+            <a:pPr/>
+            <a:r>
+              <a:t>• Content 2</a:t>
+            </a:r>
+          </a:p>
+          <a:p>
+            <a:pPr/>
+            <a:r>
+              <a:t>• Content 3</a:t>
+            </a:r>
+          </a:p>
+          <a:p>
+            <a:pPr/>
+            <a:r>
+              <a:t>• Content 4</a:t>
             </a:r>
           </a:p>
         </p:txBody>

</xml_diff>